<commit_message>
corrected typo on one slide
</commit_message>
<xml_diff>
--- a/PowerPoints/03 - Context-Free Grammars.pptx
+++ b/PowerPoints/03 - Context-Free Grammars.pptx
@@ -9621,19 +9621,7 @@
               <a:rPr lang="en-US" sz="1800" dirty="0" err="1">
                 <a:latin typeface="Consolas" panose="020B0609020204030204" pitchFamily="49" charset="0"/>
               </a:rPr>
-              <a:t>tu</a:t>
-            </a:r>
-            <a:r>
-              <a:rPr lang="en-US" sz="1800" dirty="0">
-                <a:latin typeface="Consolas" panose="020B0609020204030204" pitchFamily="49" charset="0"/>
-              </a:rPr>
-              <a:t>[</a:t>
-            </a:r>
-            <a:r>
-              <a:rPr lang="en-US" sz="1800" dirty="0" err="1">
-                <a:latin typeface="Consolas" panose="020B0609020204030204" pitchFamily="49" charset="0"/>
-              </a:rPr>
-              <a:t>eDecl</a:t>
+              <a:t>typeDecl</a:t>
             </a:r>
             <a:r>
               <a:rPr lang="en-US" sz="1800" dirty="0">

</xml_diff>

<commit_message>
minor edits to two PowerPoint slides
</commit_message>
<xml_diff>
--- a/PowerPoints/03 - Context-Free Grammars.pptx
+++ b/PowerPoints/03 - Context-Free Grammars.pptx
@@ -11748,7 +11748,7 @@
               <a:rPr lang="en-US" sz="1800" dirty="0">
                 <a:latin typeface="Consolas" pitchFamily="49" charset="0"/>
               </a:rPr>
-              <a:t> = identifier "(" expressions )" .</a:t>
+              <a:t> = identifier "(" [ expressions ] )" .</a:t>
             </a:r>
           </a:p>
         </p:txBody>
@@ -12335,7 +12335,7 @@
           <a:p>
             <a:r>
               <a:rPr lang="en-US" dirty="0"/>
-              <a:t>We can replace these alternatives by the following equivalent expression.</a:t>
+              <a:t>We can replace these alternatives with the following equivalent expression.</a:t>
             </a:r>
             <a:br>
               <a:rPr lang="en-US" dirty="0"/>

</xml_diff>

<commit_message>
minor edits to one PowerPoint slide
</commit_message>
<xml_diff>
--- a/PowerPoints/03 - Context-Free Grammars.pptx
+++ b/PowerPoints/03 - Context-Free Grammars.pptx
@@ -7808,7 +7808,7 @@
                 <a:latin typeface="Consolas" pitchFamily="49" charset="0"/>
                 <a:cs typeface="Consolas" pitchFamily="49" charset="0"/>
               </a:rPr>
-              <a:t> ":=" literal ";" .</a:t>
+              <a:t> ":=" [ "-" ] literal ";" .</a:t>
             </a:r>
           </a:p>
           <a:p>
@@ -20101,7 +20101,7 @@
           <a:p>
             <a:r>
               <a:rPr lang="en-US" dirty="0"/>
-              <a:t>Specifies the evaluation order of operators with the same precedence when there are no parentheses.</a:t>
+              <a:t>Specifies the evaluation order of adjacent operators with the same precedence when there are no parentheses.</a:t>
             </a:r>
           </a:p>
           <a:p>
@@ -20257,6 +20257,46 @@
               <a:t>39</a:t>
             </a:fld>
             <a:endParaRPr lang="en-US"/>
+          </a:p>
+        </p:txBody>
+      </p:sp>
+      <p:sp>
+        <p:nvSpPr>
+          <p:cNvPr id="6" name="TextBox 5">
+            <a:extLst>
+              <a:ext uri="{FF2B5EF4-FFF2-40B4-BE49-F238E27FC236}">
+                <a16:creationId xmlns:a16="http://schemas.microsoft.com/office/drawing/2014/main" id="{A7889292-0DB3-CD0D-A714-A73E4472C368}"/>
+              </a:ext>
+            </a:extLst>
+          </p:cNvPr>
+          <p:cNvSpPr txBox="1"/>
+          <p:nvPr/>
+        </p:nvSpPr>
+        <p:spPr>
+          <a:xfrm>
+            <a:off x="1250514" y="5410200"/>
+            <a:ext cx="6642972" cy="461665"/>
+          </a:xfrm>
+          <a:prstGeom prst="rect">
+            <a:avLst/>
+          </a:prstGeom>
+          <a:noFill/>
+          <a:ln>
+            <a:solidFill>
+              <a:schemeClr val="tx1"/>
+            </a:solidFill>
+          </a:ln>
+        </p:spPr>
+        <p:txBody>
+          <a:bodyPr wrap="none" rtlCol="0">
+            <a:spAutoFit/>
+          </a:bodyPr>
+          <a:lstStyle/>
+          <a:p>
+            <a:r>
+              <a:rPr lang="en-US" dirty="0"/>
+              <a:t>Note: All operators in CPRL are left associative.</a:t>
+            </a:r>
           </a:p>
         </p:txBody>
       </p:sp>

</xml_diff>

<commit_message>
minor improvement to one PowerPoint slide
</commit_message>
<xml_diff>
--- a/PowerPoints/03 - Context-Free Grammars.pptx
+++ b/PowerPoints/03 - Context-Free Grammars.pptx
@@ -52,7 +52,7 @@
     <p:sldId id="304" r:id="rId40"/>
     <p:sldId id="280" r:id="rId41"/>
     <p:sldId id="287" r:id="rId42"/>
-    <p:sldId id="308" r:id="rId43"/>
+    <p:sldId id="309" r:id="rId43"/>
     <p:sldId id="307" r:id="rId44"/>
   </p:sldIdLst>
   <p:sldSz cx="9144000" cy="6858000" type="screen4x3"/>
@@ -22744,7 +22744,17 @@
           <a:p>
             <a:r>
               <a:rPr lang="en-US" dirty="0"/>
-              <a:t>Example 2: Consider the grammar for a while statement.</a:t>
+              <a:t>Example 2: Consider the following rule for a </a:t>
+            </a:r>
+            <a:r>
+              <a:rPr lang="en-US" dirty="0">
+                <a:latin typeface="Consolas" panose="020B0609020204030204" pitchFamily="49" charset="0"/>
+              </a:rPr>
+              <a:t>while</a:t>
+            </a:r>
+            <a:r>
+              <a:rPr lang="en-US" dirty="0"/>
+              <a:t> statement.</a:t>
             </a:r>
             <a:br>
               <a:rPr lang="en-US" dirty="0"/>
@@ -22763,7 +22773,7 @@
               <a:rPr lang="en-US" sz="2000" dirty="0">
                 <a:latin typeface="Consolas" pitchFamily="49" charset="0"/>
               </a:rPr>
-              <a:t> = "while" "(" </a:t>
+              <a:t> = "while" </a:t>
             </a:r>
             <a:r>
               <a:rPr lang="en-US" sz="2000" dirty="0" err="1">
@@ -22775,14 +22785,34 @@
               <a:rPr lang="en-US" sz="2000" dirty="0">
                 <a:latin typeface="Consolas" pitchFamily="49" charset="0"/>
               </a:rPr>
-              <a:t> ")" statement .</a:t>
+              <a:t> "loop" statement .</a:t>
             </a:r>
             <a:endParaRPr lang="en-US" sz="2800" dirty="0"/>
           </a:p>
           <a:p>
             <a:r>
               <a:rPr lang="en-US" dirty="0"/>
-              <a:t>Once a while statement has been parsed, we don’t need to retain the terminal symbols.  The abstract syntax tree for a while statement would contain only </a:t>
+              <a:t>Once a while statement has been parsed, we don’t need to retain the terminal symbols </a:t>
+            </a:r>
+            <a:r>
+              <a:rPr lang="en-US" dirty="0">
+                <a:latin typeface="Consolas" panose="020B0609020204030204" pitchFamily="49" charset="0"/>
+              </a:rPr>
+              <a:t>"while"</a:t>
+            </a:r>
+            <a:r>
+              <a:rPr lang="en-US" dirty="0"/>
+              <a:t> and </a:t>
+            </a:r>
+            <a:r>
+              <a:rPr lang="en-US" dirty="0">
+                <a:latin typeface="Consolas" panose="020B0609020204030204" pitchFamily="49" charset="0"/>
+              </a:rPr>
+              <a:t>"loop"</a:t>
+            </a:r>
+            <a:r>
+              <a:rPr lang="en-US" dirty="0"/>
+              <a:t>.  The abstract syntax tree for a while statement would contain only </a:t>
             </a:r>
             <a:r>
               <a:rPr lang="en-US" dirty="0" err="1">
@@ -22848,7 +22878,7 @@
         </p:nvGrpSpPr>
         <p:grpSpPr>
           <a:xfrm>
-            <a:off x="2871614" y="4191000"/>
+            <a:off x="2871614" y="4399848"/>
             <a:ext cx="3084066" cy="1315152"/>
             <a:chOff x="2871614" y="4552248"/>
             <a:chExt cx="3084066" cy="1315152"/>
@@ -23036,7 +23066,7 @@
     </p:spTree>
     <p:extLst>
       <p:ext uri="{BB962C8B-B14F-4D97-AF65-F5344CB8AC3E}">
-        <p14:creationId xmlns:p14="http://schemas.microsoft.com/office/powerpoint/2010/main" val="1258298329"/>
+        <p14:creationId xmlns:p14="http://schemas.microsoft.com/office/powerpoint/2010/main" val="13369269"/>
       </p:ext>
     </p:extLst>
   </p:cSld>

</xml_diff>

<commit_message>
minor correction to one PowerPoint slice
</commit_message>
<xml_diff>
--- a/PowerPoints/03 - Context-Free Grammars.pptx
+++ b/PowerPoints/03 - Context-Free Grammars.pptx
@@ -6904,7 +6904,15 @@
           <a:p>
             <a:r>
               <a:rPr lang="en-US" dirty="0"/>
-              <a:t>The right side of the rule is a sequence of terminal symbols, nonterminal symbols, and other special symbols as define on the next slide.</a:t>
+              <a:t>The right side of the rule is a sequence of terminal symbols, nonterminal symbols, and other special symbols </a:t>
+            </a:r>
+            <a:r>
+              <a:rPr lang="en-US"/>
+              <a:t>as defined </a:t>
+            </a:r>
+            <a:r>
+              <a:rPr lang="en-US" dirty="0"/>
+              <a:t>on the next slide.</a:t>
             </a:r>
           </a:p>
           <a:p>

</xml_diff>